<commit_message>
Added more to angular slides
Added more to angular slides
</commit_message>
<xml_diff>
--- a/angular-js/Getting Started with AngularJS.pptx
+++ b/angular-js/Getting Started with AngularJS.pptx
@@ -249,7 +249,7 @@
           <a:p>
             <a:fld id="{1FBC307E-BFDF-4D62-B554-0C8B7619B15D}" type="datetimeFigureOut">
               <a:rPr lang="en-US" smtClean="0"/>
-              <a:t>10/21/2014</a:t>
+              <a:t>11/5/2014</a:t>
             </a:fld>
             <a:endParaRPr lang="en-US"/>
           </a:p>
@@ -419,7 +419,7 @@
           <a:p>
             <a:fld id="{1FBC307E-BFDF-4D62-B554-0C8B7619B15D}" type="datetimeFigureOut">
               <a:rPr lang="en-US" smtClean="0"/>
-              <a:t>10/21/2014</a:t>
+              <a:t>11/5/2014</a:t>
             </a:fld>
             <a:endParaRPr lang="en-US"/>
           </a:p>
@@ -599,7 +599,7 @@
           <a:p>
             <a:fld id="{1FBC307E-BFDF-4D62-B554-0C8B7619B15D}" type="datetimeFigureOut">
               <a:rPr lang="en-US" smtClean="0"/>
-              <a:t>10/21/2014</a:t>
+              <a:t>11/5/2014</a:t>
             </a:fld>
             <a:endParaRPr lang="en-US"/>
           </a:p>
@@ -769,7 +769,7 @@
           <a:p>
             <a:fld id="{1FBC307E-BFDF-4D62-B554-0C8B7619B15D}" type="datetimeFigureOut">
               <a:rPr lang="en-US" smtClean="0"/>
-              <a:t>10/21/2014</a:t>
+              <a:t>11/5/2014</a:t>
             </a:fld>
             <a:endParaRPr lang="en-US"/>
           </a:p>
@@ -1015,7 +1015,7 @@
           <a:p>
             <a:fld id="{1FBC307E-BFDF-4D62-B554-0C8B7619B15D}" type="datetimeFigureOut">
               <a:rPr lang="en-US" smtClean="0"/>
-              <a:t>10/21/2014</a:t>
+              <a:t>11/5/2014</a:t>
             </a:fld>
             <a:endParaRPr lang="en-US"/>
           </a:p>
@@ -1247,7 +1247,7 @@
           <a:p>
             <a:fld id="{1FBC307E-BFDF-4D62-B554-0C8B7619B15D}" type="datetimeFigureOut">
               <a:rPr lang="en-US" smtClean="0"/>
-              <a:t>10/21/2014</a:t>
+              <a:t>11/5/2014</a:t>
             </a:fld>
             <a:endParaRPr lang="en-US"/>
           </a:p>
@@ -1614,7 +1614,7 @@
           <a:p>
             <a:fld id="{1FBC307E-BFDF-4D62-B554-0C8B7619B15D}" type="datetimeFigureOut">
               <a:rPr lang="en-US" smtClean="0"/>
-              <a:t>10/21/2014</a:t>
+              <a:t>11/5/2014</a:t>
             </a:fld>
             <a:endParaRPr lang="en-US"/>
           </a:p>
@@ -1732,7 +1732,7 @@
           <a:p>
             <a:fld id="{1FBC307E-BFDF-4D62-B554-0C8B7619B15D}" type="datetimeFigureOut">
               <a:rPr lang="en-US" smtClean="0"/>
-              <a:t>10/21/2014</a:t>
+              <a:t>11/5/2014</a:t>
             </a:fld>
             <a:endParaRPr lang="en-US"/>
           </a:p>
@@ -1827,7 +1827,7 @@
           <a:p>
             <a:fld id="{1FBC307E-BFDF-4D62-B554-0C8B7619B15D}" type="datetimeFigureOut">
               <a:rPr lang="en-US" smtClean="0"/>
-              <a:t>10/21/2014</a:t>
+              <a:t>11/5/2014</a:t>
             </a:fld>
             <a:endParaRPr lang="en-US"/>
           </a:p>
@@ -2104,7 +2104,7 @@
           <a:p>
             <a:fld id="{1FBC307E-BFDF-4D62-B554-0C8B7619B15D}" type="datetimeFigureOut">
               <a:rPr lang="en-US" smtClean="0"/>
-              <a:t>10/21/2014</a:t>
+              <a:t>11/5/2014</a:t>
             </a:fld>
             <a:endParaRPr lang="en-US"/>
           </a:p>
@@ -2357,7 +2357,7 @@
           <a:p>
             <a:fld id="{1FBC307E-BFDF-4D62-B554-0C8B7619B15D}" type="datetimeFigureOut">
               <a:rPr lang="en-US" smtClean="0"/>
-              <a:t>10/21/2014</a:t>
+              <a:t>11/5/2014</a:t>
             </a:fld>
             <a:endParaRPr lang="en-US"/>
           </a:p>
@@ -2570,7 +2570,7 @@
           <a:p>
             <a:fld id="{1FBC307E-BFDF-4D62-B554-0C8B7619B15D}" type="datetimeFigureOut">
               <a:rPr lang="en-US" smtClean="0"/>
-              <a:t>10/21/2014</a:t>
+              <a:t>11/5/2014</a:t>
             </a:fld>
             <a:endParaRPr lang="en-US"/>
           </a:p>
@@ -3353,8 +3353,16 @@
           <a:lstStyle/>
           <a:p>
             <a:r>
+              <a:rPr lang="en-US" smtClean="0"/>
+              <a:t>JavaScript </a:t>
+            </a:r>
+            <a:r>
+              <a:rPr lang="en-US" smtClean="0"/>
+              <a:t>MVW (Model –View-Whatever) </a:t>
+            </a:r>
+            <a:r>
               <a:rPr lang="en-US" dirty="0" smtClean="0"/>
-              <a:t>JavaScript MVW framework</a:t>
+              <a:t>framework</a:t>
             </a:r>
           </a:p>
           <a:p>
@@ -3581,11 +3589,7 @@
             </a:pPr>
             <a:r>
               <a:rPr lang="en-US" dirty="0" smtClean="0"/>
-              <a:t>Compared </a:t>
-            </a:r>
-            <a:r>
-              <a:rPr lang="en-US" dirty="0" smtClean="0"/>
-              <a:t>to Win Forms</a:t>
+              <a:t>Compared to Win Forms</a:t>
             </a:r>
           </a:p>
           <a:p>

</xml_diff>

<commit_message>
Hello world demo and set up angular script references in all the projects. Added images to presentation
</commit_message>
<xml_diff>
--- a/angular-js/Getting Started with AngularJS.pptx
+++ b/angular-js/Getting Started with AngularJS.pptx
@@ -9,7 +9,7 @@
     <p:sldId id="258" r:id="rId3"/>
     <p:sldId id="257" r:id="rId4"/>
     <p:sldId id="259" r:id="rId5"/>
-    <p:sldId id="260" r:id="rId6"/>
+    <p:sldId id="264" r:id="rId6"/>
     <p:sldId id="261" r:id="rId7"/>
     <p:sldId id="262" r:id="rId8"/>
     <p:sldId id="263" r:id="rId9"/>
@@ -113,7 +113,7 @@
   </p:defaultTextStyle>
   <p:extLst>
     <p:ext uri="{EFAFB233-063F-42B5-8137-9DF3F51BA10A}">
-      <p15:sldGuideLst xmlns:p15="http://schemas.microsoft.com/office/powerpoint/2012/main"/>
+      <p15:sldGuideLst xmlns:p15="http://schemas.microsoft.com/office/powerpoint/2012/main" xmlns=""/>
     </p:ext>
   </p:extLst>
 </p:presentation>
@@ -307,7 +307,7 @@
           <a:p>
             <a:fld id="{1FBC307E-BFDF-4D62-B554-0C8B7619B15D}" type="datetimeFigureOut">
               <a:rPr lang="en-US" smtClean="0"/>
-              <a:t>11/6/2014</a:t>
+              <a:t>11/7/2014</a:t>
             </a:fld>
             <a:endParaRPr lang="en-US"/>
           </a:p>
@@ -645,7 +645,7 @@
           <a:p>
             <a:fld id="{1FBC307E-BFDF-4D62-B554-0C8B7619B15D}" type="datetimeFigureOut">
               <a:rPr lang="en-US" smtClean="0"/>
-              <a:t>11/6/2014</a:t>
+              <a:t>11/7/2014</a:t>
             </a:fld>
             <a:endParaRPr lang="en-US"/>
           </a:p>
@@ -1046,7 +1046,7 @@
           <a:p>
             <a:fld id="{1FBC307E-BFDF-4D62-B554-0C8B7619B15D}" type="datetimeFigureOut">
               <a:rPr lang="en-US" smtClean="0"/>
-              <a:t>11/6/2014</a:t>
+              <a:t>11/7/2014</a:t>
             </a:fld>
             <a:endParaRPr lang="en-US"/>
           </a:p>
@@ -1382,7 +1382,7 @@
           <a:p>
             <a:fld id="{1FBC307E-BFDF-4D62-B554-0C8B7619B15D}" type="datetimeFigureOut">
               <a:rPr lang="en-US" smtClean="0"/>
-              <a:t>11/6/2014</a:t>
+              <a:t>11/7/2014</a:t>
             </a:fld>
             <a:endParaRPr lang="en-US"/>
           </a:p>
@@ -1702,7 +1702,7 @@
           <a:p>
             <a:fld id="{1FBC307E-BFDF-4D62-B554-0C8B7619B15D}" type="datetimeFigureOut">
               <a:rPr lang="en-US" smtClean="0"/>
-              <a:t>11/6/2014</a:t>
+              <a:t>11/7/2014</a:t>
             </a:fld>
             <a:endParaRPr lang="en-US"/>
           </a:p>
@@ -2098,7 +2098,7 @@
           <a:p>
             <a:fld id="{1FBC307E-BFDF-4D62-B554-0C8B7619B15D}" type="datetimeFigureOut">
               <a:rPr lang="en-US" smtClean="0"/>
-              <a:t>11/6/2014</a:t>
+              <a:t>11/7/2014</a:t>
             </a:fld>
             <a:endParaRPr lang="en-US"/>
           </a:p>
@@ -2355,7 +2355,7 @@
           <a:p>
             <a:fld id="{1FBC307E-BFDF-4D62-B554-0C8B7619B15D}" type="datetimeFigureOut">
               <a:rPr lang="en-US" smtClean="0"/>
-              <a:t>11/6/2014</a:t>
+              <a:t>11/7/2014</a:t>
             </a:fld>
             <a:endParaRPr lang="en-US"/>
           </a:p>
@@ -2617,7 +2617,7 @@
           <a:p>
             <a:fld id="{1FBC307E-BFDF-4D62-B554-0C8B7619B15D}" type="datetimeFigureOut">
               <a:rPr lang="en-US" smtClean="0"/>
-              <a:t>11/6/2014</a:t>
+              <a:t>11/7/2014</a:t>
             </a:fld>
             <a:endParaRPr lang="en-US"/>
           </a:p>
@@ -2879,7 +2879,7 @@
           <a:p>
             <a:fld id="{1FBC307E-BFDF-4D62-B554-0C8B7619B15D}" type="datetimeFigureOut">
               <a:rPr lang="en-US" smtClean="0"/>
-              <a:t>11/6/2014</a:t>
+              <a:t>11/7/2014</a:t>
             </a:fld>
             <a:endParaRPr lang="en-US"/>
           </a:p>
@@ -3208,7 +3208,7 @@
           <a:p>
             <a:fld id="{1FBC307E-BFDF-4D62-B554-0C8B7619B15D}" type="datetimeFigureOut">
               <a:rPr lang="en-US" smtClean="0"/>
-              <a:t>11/6/2014</a:t>
+              <a:t>11/7/2014</a:t>
             </a:fld>
             <a:endParaRPr lang="en-US"/>
           </a:p>
@@ -3531,7 +3531,7 @@
           <a:p>
             <a:fld id="{1FBC307E-BFDF-4D62-B554-0C8B7619B15D}" type="datetimeFigureOut">
               <a:rPr lang="en-US" smtClean="0"/>
-              <a:t>11/6/2014</a:t>
+              <a:t>11/7/2014</a:t>
             </a:fld>
             <a:endParaRPr lang="en-US"/>
           </a:p>
@@ -3988,7 +3988,7 @@
           <a:p>
             <a:fld id="{1FBC307E-BFDF-4D62-B554-0C8B7619B15D}" type="datetimeFigureOut">
               <a:rPr lang="en-US" smtClean="0"/>
-              <a:t>11/6/2014</a:t>
+              <a:t>11/7/2014</a:t>
             </a:fld>
             <a:endParaRPr lang="en-US"/>
           </a:p>
@@ -4193,7 +4193,7 @@
           <a:p>
             <a:fld id="{1FBC307E-BFDF-4D62-B554-0C8B7619B15D}" type="datetimeFigureOut">
               <a:rPr lang="en-US" smtClean="0"/>
-              <a:t>11/6/2014</a:t>
+              <a:t>11/7/2014</a:t>
             </a:fld>
             <a:endParaRPr lang="en-US"/>
           </a:p>
@@ -4370,7 +4370,7 @@
           <a:p>
             <a:fld id="{1FBC307E-BFDF-4D62-B554-0C8B7619B15D}" type="datetimeFigureOut">
               <a:rPr lang="en-US" smtClean="0"/>
-              <a:t>11/6/2014</a:t>
+              <a:t>11/7/2014</a:t>
             </a:fld>
             <a:endParaRPr lang="en-US"/>
           </a:p>
@@ -4703,7 +4703,7 @@
           <a:p>
             <a:fld id="{1FBC307E-BFDF-4D62-B554-0C8B7619B15D}" type="datetimeFigureOut">
               <a:rPr lang="en-US" smtClean="0"/>
-              <a:t>11/6/2014</a:t>
+              <a:t>11/7/2014</a:t>
             </a:fld>
             <a:endParaRPr lang="en-US"/>
           </a:p>
@@ -5048,7 +5048,7 @@
           <a:p>
             <a:fld id="{1FBC307E-BFDF-4D62-B554-0C8B7619B15D}" type="datetimeFigureOut">
               <a:rPr lang="en-US" smtClean="0"/>
-              <a:t>11/6/2014</a:t>
+              <a:t>11/7/2014</a:t>
             </a:fld>
             <a:endParaRPr lang="en-US"/>
           </a:p>
@@ -7165,7 +7165,7 @@
           <a:p>
             <a:fld id="{1FBC307E-BFDF-4D62-B554-0C8B7619B15D}" type="datetimeFigureOut">
               <a:rPr lang="en-US" smtClean="0"/>
-              <a:t>11/6/2014</a:t>
+              <a:t>11/7/2014</a:t>
             </a:fld>
             <a:endParaRPr lang="en-US"/>
           </a:p>
@@ -7707,23 +7707,23 @@
           <a:p>
             <a:r>
               <a:rPr lang="en-US" dirty="0" smtClean="0"/>
-              <a:t>Getting Started with </a:t>
+              <a:t>Getting Started </a:t>
             </a:r>
             <a:r>
               <a:rPr lang="en-US" dirty="0" smtClean="0"/>
-              <a:t>AngularJS </a:t>
+              <a:t>with </a:t>
+            </a:r>
+            <a:r>
+              <a:rPr lang="en-US" dirty="0" err="1" smtClean="0"/>
+              <a:t>AngularJS</a:t>
             </a:r>
             <a:r>
               <a:rPr lang="en-US" dirty="0" smtClean="0"/>
-              <a:t>as a </a:t>
+              <a:t> as </a:t>
             </a:r>
             <a:r>
               <a:rPr lang="en-US" dirty="0" smtClean="0"/>
-              <a:t>.</a:t>
-            </a:r>
-            <a:r>
-              <a:rPr lang="en-US" dirty="0" smtClean="0"/>
-              <a:t>NET Developer</a:t>
+              <a:t>a .NET Developer</a:t>
             </a:r>
             <a:endParaRPr lang="en-US" dirty="0"/>
           </a:p>
@@ -7754,11 +7754,7 @@
           <a:p>
             <a:r>
               <a:rPr lang="en-US" sz="3600" dirty="0" smtClean="0"/>
-              <a:t>@</a:t>
-            </a:r>
-            <a:r>
-              <a:rPr lang="en-US" sz="3600" dirty="0" smtClean="0"/>
-              <a:t>jacobladams</a:t>
+              <a:t>@jacobladams</a:t>
             </a:r>
           </a:p>
           <a:p>
@@ -8112,14 +8108,27 @@
             <p:ph type="title"/>
           </p:nvPr>
         </p:nvSpPr>
-        <p:spPr/>
+        <p:spPr>
+          <a:xfrm>
+            <a:off x="2307175" y="632275"/>
+            <a:ext cx="8911687" cy="1280890"/>
+          </a:xfrm>
+        </p:spPr>
         <p:txBody>
           <a:bodyPr/>
           <a:lstStyle/>
           <a:p>
             <a:r>
               <a:rPr lang="en-US" dirty="0" smtClean="0"/>
-              <a:t>What is AngularJS (add image)</a:t>
+              <a:t>What is </a:t>
+            </a:r>
+            <a:r>
+              <a:rPr lang="en-US" dirty="0" err="1" smtClean="0"/>
+              <a:t>AngularJS</a:t>
+            </a:r>
+            <a:r>
+              <a:rPr lang="en-US" dirty="0" smtClean="0"/>
+              <a:t>?</a:t>
             </a:r>
             <a:endParaRPr lang="en-US" dirty="0"/>
           </a:p>
@@ -8152,15 +8161,7 @@
             </a:pPr>
             <a:r>
               <a:rPr lang="en-US" sz="3200" dirty="0" smtClean="0"/>
-              <a:t>JavaScript MVW (</a:t>
-            </a:r>
-            <a:r>
-              <a:rPr lang="en-US" sz="3200" dirty="0" smtClean="0"/>
-              <a:t>Model–View-Whatever</a:t>
-            </a:r>
-            <a:r>
-              <a:rPr lang="en-US" sz="3200" dirty="0" smtClean="0"/>
-              <a:t>) framework</a:t>
+              <a:t>JavaScript MVW (Model–View-Whatever) framework</a:t>
             </a:r>
           </a:p>
           <a:p>
@@ -8200,6 +8201,47 @@
           </a:p>
         </p:txBody>
       </p:sp>
+      <p:pic>
+        <p:nvPicPr>
+          <p:cNvPr id="6" name="Picture 3" descr="C:\Users\adamsjl\Desktop\AngularJS-medium.png"/>
+          <p:cNvPicPr>
+            <a:picLocks noChangeAspect="1" noChangeArrowheads="1"/>
+          </p:cNvPicPr>
+          <p:nvPr/>
+        </p:nvPicPr>
+        <p:blipFill>
+          <a:blip r:embed="rId2">
+            <a:extLst>
+              <a:ext uri="{28A0092B-C50C-407E-A947-70E740481C1C}">
+                <a14:useLocalDpi xmlns:a14="http://schemas.microsoft.com/office/drawing/2010/main" val="0"/>
+              </a:ext>
+            </a:extLst>
+          </a:blip>
+          <a:srcRect/>
+          <a:stretch>
+            <a:fillRect/>
+          </a:stretch>
+        </p:blipFill>
+        <p:spPr bwMode="auto">
+          <a:xfrm>
+            <a:off x="8004465" y="488196"/>
+            <a:ext cx="3613312" cy="931937"/>
+          </a:xfrm>
+          <a:prstGeom prst="rect">
+            <a:avLst/>
+          </a:prstGeom>
+          <a:noFill/>
+          <a:extLst>
+            <a:ext uri="{909E8E84-426E-40DD-AFC4-6F175D3DCCD1}">
+              <a14:hiddenFill xmlns:a14="http://schemas.microsoft.com/office/drawing/2010/main">
+                <a:solidFill>
+                  <a:srgbClr val="FFFFFF"/>
+                </a:solidFill>
+              </a14:hiddenFill>
+            </a:ext>
+          </a:extLst>
+        </p:spPr>
+      </p:pic>
     </p:spTree>
     <p:extLst>
       <p:ext uri="{BB962C8B-B14F-4D97-AF65-F5344CB8AC3E}">
@@ -8407,69 +8449,80 @@
           <a:chExt cx="0" cy="0"/>
         </a:xfrm>
       </p:grpSpPr>
-      <p:sp>
-        <p:nvSpPr>
-          <p:cNvPr id="2" name="Title 1"/>
-          <p:cNvSpPr>
-            <a:spLocks noGrp="1"/>
-          </p:cNvSpPr>
-          <p:nvPr>
-            <p:ph type="title"/>
-          </p:nvPr>
-        </p:nvSpPr>
-        <p:spPr/>
-        <p:txBody>
-          <a:bodyPr/>
-          <a:lstStyle/>
-          <a:p>
-            <a:r>
-              <a:rPr lang="en-US" dirty="0" smtClean="0"/>
-              <a:t>Basic Demo</a:t>
-            </a:r>
-            <a:endParaRPr lang="en-US" dirty="0"/>
-          </a:p>
-        </p:txBody>
-      </p:sp>
-      <p:sp>
-        <p:nvSpPr>
-          <p:cNvPr id="3" name="Content Placeholder 2"/>
-          <p:cNvSpPr>
-            <a:spLocks noGrp="1"/>
-          </p:cNvSpPr>
-          <p:nvPr>
-            <p:ph idx="1"/>
-          </p:nvPr>
-        </p:nvSpPr>
-        <p:spPr/>
-        <p:txBody>
-          <a:bodyPr/>
-          <a:lstStyle/>
-          <a:p>
-            <a:r>
-              <a:rPr lang="en-US" dirty="0" smtClean="0"/>
-              <a:t>(Hello world image)</a:t>
-            </a:r>
-            <a:endParaRPr lang="en-US" dirty="0"/>
-          </a:p>
-        </p:txBody>
-      </p:sp>
+      <p:pic>
+        <p:nvPicPr>
+          <p:cNvPr id="2050" name="Picture 2"/>
+          <p:cNvPicPr>
+            <a:picLocks noChangeAspect="1" noChangeArrowheads="1"/>
+          </p:cNvPicPr>
+          <p:nvPr/>
+        </p:nvPicPr>
+        <p:blipFill>
+          <a:blip r:embed="rId2">
+            <a:extLst>
+              <a:ext uri="{28A0092B-C50C-407E-A947-70E740481C1C}">
+                <a14:useLocalDpi xmlns:a14="http://schemas.microsoft.com/office/drawing/2010/main" val="0"/>
+              </a:ext>
+            </a:extLst>
+          </a:blip>
+          <a:srcRect/>
+          <a:stretch>
+            <a:fillRect/>
+          </a:stretch>
+        </p:blipFill>
+        <p:spPr bwMode="auto">
+          <a:xfrm>
+            <a:off x="1896836" y="0"/>
+            <a:ext cx="10295164" cy="6864077"/>
+          </a:xfrm>
+          <a:prstGeom prst="rect">
+            <a:avLst/>
+          </a:prstGeom>
+          <a:noFill/>
+          <a:ln>
+            <a:noFill/>
+          </a:ln>
+          <a:effectLst/>
+          <a:extLst>
+            <a:ext uri="{909E8E84-426E-40DD-AFC4-6F175D3DCCD1}">
+              <a14:hiddenFill xmlns:a14="http://schemas.microsoft.com/office/drawing/2010/main">
+                <a:solidFill>
+                  <a:schemeClr val="accent1"/>
+                </a:solidFill>
+              </a14:hiddenFill>
+            </a:ext>
+            <a:ext uri="{91240B29-F687-4F45-9708-019B960494DF}">
+              <a14:hiddenLine xmlns:a14="http://schemas.microsoft.com/office/drawing/2010/main" w="9525">
+                <a:solidFill>
+                  <a:schemeClr val="tx1"/>
+                </a:solidFill>
+                <a:miter lim="800000"/>
+                <a:headEnd/>
+                <a:tailEnd/>
+              </a14:hiddenLine>
+            </a:ext>
+            <a:ext uri="{AF507438-7753-43E0-B8FC-AC1667EBCBE1}">
+              <a14:hiddenEffects xmlns:a14="http://schemas.microsoft.com/office/drawing/2010/main">
+                <a:effectLst>
+                  <a:outerShdw dist="35921" dir="2700000" algn="ctr" rotWithShape="0">
+                    <a:schemeClr val="bg2"/>
+                  </a:outerShdw>
+                </a:effectLst>
+              </a14:hiddenEffects>
+            </a:ext>
+          </a:extLst>
+        </p:spPr>
+      </p:pic>
     </p:spTree>
     <p:extLst>
       <p:ext uri="{BB962C8B-B14F-4D97-AF65-F5344CB8AC3E}">
-        <p14:creationId xmlns:p14="http://schemas.microsoft.com/office/powerpoint/2010/main" val="4265676560"/>
+        <p14:creationId xmlns:p14="http://schemas.microsoft.com/office/powerpoint/2010/main" val="3310384366"/>
       </p:ext>
     </p:extLst>
   </p:cSld>
   <p:clrMapOvr>
     <a:masterClrMapping/>
   </p:clrMapOvr>
-  <p:timing>
-    <p:tnLst>
-      <p:par>
-        <p:cTn id="1" dur="indefinite" restart="never" nodeType="tmRoot"/>
-      </p:par>
-    </p:tnLst>
-  </p:timing>
 </p:sld>
 </file>
 
@@ -8577,7 +8630,6 @@
               <a:rPr lang="en-US" sz="2600" dirty="0" smtClean="0"/>
               <a:t>For Building Web Applications</a:t>
             </a:r>
-            <a:endParaRPr lang="en-US" sz="2600" dirty="0" smtClean="0"/>
           </a:p>
         </p:txBody>
       </p:sp>
@@ -9014,7 +9066,7 @@
   <a:extraClrSchemeLst/>
   <a:extLst>
     <a:ext uri="{05A4C25C-085E-4340-85A3-A5531E510DB2}">
-      <thm15:themeFamily xmlns:thm15="http://schemas.microsoft.com/office/thememl/2012/main" name="Wisp" id="{7CB32D59-10C0-40DD-B7BD-2E94284A981C}" vid="{24B1A44C-C006-48B2-A4D7-E5549B3D8CD4}"/>
+      <thm15:themeFamily xmlns:thm15="http://schemas.microsoft.com/office/thememl/2012/main" xmlns="" name="Wisp" id="{7CB32D59-10C0-40DD-B7BD-2E94284A981C}" vid="{24B1A44C-C006-48B2-A4D7-E5549B3D8CD4}"/>
     </a:ext>
   </a:extLst>
 </a:theme>

</xml_diff>

<commit_message>
Added missing files to demos and added slide about Angular 2.0
</commit_message>
<xml_diff>
--- a/angular-js/Getting Started with AngularJS.pptx
+++ b/angular-js/Getting Started with AngularJS.pptx
@@ -5,7 +5,7 @@
     <p:sldMasterId id="2147483940" r:id="rId1"/>
   </p:sldMasterIdLst>
   <p:notesMasterIdLst>
-    <p:notesMasterId r:id="rId15"/>
+    <p:notesMasterId r:id="rId16"/>
   </p:notesMasterIdLst>
   <p:sldIdLst>
     <p:sldId id="256" r:id="rId2"/>
@@ -19,8 +19,9 @@
     <p:sldId id="263" r:id="rId10"/>
     <p:sldId id="270" r:id="rId11"/>
     <p:sldId id="271" r:id="rId12"/>
-    <p:sldId id="269" r:id="rId13"/>
-    <p:sldId id="268" r:id="rId14"/>
+    <p:sldId id="274" r:id="rId13"/>
+    <p:sldId id="269" r:id="rId14"/>
+    <p:sldId id="268" r:id="rId15"/>
   </p:sldIdLst>
   <p:sldSz cx="9144000" cy="6858000" type="screen4x3"/>
   <p:notesSz cx="6858000" cy="9144000"/>
@@ -220,7 +221,7 @@
           <a:p>
             <a:fld id="{AC33384C-A5DC-48EC-9B26-0C8A1E65CE5A}" type="datetimeFigureOut">
               <a:rPr lang="en-US" smtClean="0"/>
-              <a:t>2/22/2015</a:t>
+              <a:t>2/23/2015</a:t>
             </a:fld>
             <a:endParaRPr lang="en-US"/>
           </a:p>
@@ -676,7 +677,7 @@
           <a:p>
             <a:fld id="{1FBC307E-BFDF-4D62-B554-0C8B7619B15D}" type="datetimeFigureOut">
               <a:rPr lang="en-US" smtClean="0"/>
-              <a:t>2/22/2015</a:t>
+              <a:t>2/23/2015</a:t>
             </a:fld>
             <a:endParaRPr lang="en-US"/>
           </a:p>
@@ -1008,7 +1009,7 @@
           <a:p>
             <a:fld id="{1FBC307E-BFDF-4D62-B554-0C8B7619B15D}" type="datetimeFigureOut">
               <a:rPr lang="en-US" smtClean="0"/>
-              <a:t>2/22/2015</a:t>
+              <a:t>2/23/2015</a:t>
             </a:fld>
             <a:endParaRPr lang="en-US"/>
           </a:p>
@@ -1407,7 +1408,7 @@
           <a:p>
             <a:fld id="{1FBC307E-BFDF-4D62-B554-0C8B7619B15D}" type="datetimeFigureOut">
               <a:rPr lang="en-US" smtClean="0"/>
-              <a:t>2/22/2015</a:t>
+              <a:t>2/23/2015</a:t>
             </a:fld>
             <a:endParaRPr lang="en-US"/>
           </a:p>
@@ -1741,7 +1742,7 @@
           <a:p>
             <a:fld id="{1FBC307E-BFDF-4D62-B554-0C8B7619B15D}" type="datetimeFigureOut">
               <a:rPr lang="en-US" smtClean="0"/>
-              <a:t>2/22/2015</a:t>
+              <a:t>2/23/2015</a:t>
             </a:fld>
             <a:endParaRPr lang="en-US"/>
           </a:p>
@@ -2059,7 +2060,7 @@
           <a:p>
             <a:fld id="{1FBC307E-BFDF-4D62-B554-0C8B7619B15D}" type="datetimeFigureOut">
               <a:rPr lang="en-US" smtClean="0"/>
-              <a:t>2/22/2015</a:t>
+              <a:t>2/23/2015</a:t>
             </a:fld>
             <a:endParaRPr lang="en-US"/>
           </a:p>
@@ -2453,7 +2454,7 @@
           <a:p>
             <a:fld id="{1FBC307E-BFDF-4D62-B554-0C8B7619B15D}" type="datetimeFigureOut">
               <a:rPr lang="en-US" smtClean="0"/>
-              <a:t>2/22/2015</a:t>
+              <a:t>2/23/2015</a:t>
             </a:fld>
             <a:endParaRPr lang="en-US"/>
           </a:p>
@@ -2708,7 +2709,7 @@
           <a:p>
             <a:fld id="{1FBC307E-BFDF-4D62-B554-0C8B7619B15D}" type="datetimeFigureOut">
               <a:rPr lang="en-US" smtClean="0"/>
-              <a:t>2/22/2015</a:t>
+              <a:t>2/23/2015</a:t>
             </a:fld>
             <a:endParaRPr lang="en-US"/>
           </a:p>
@@ -2968,7 +2969,7 @@
           <a:p>
             <a:fld id="{1FBC307E-BFDF-4D62-B554-0C8B7619B15D}" type="datetimeFigureOut">
               <a:rPr lang="en-US" smtClean="0"/>
-              <a:t>2/22/2015</a:t>
+              <a:t>2/23/2015</a:t>
             </a:fld>
             <a:endParaRPr lang="en-US"/>
           </a:p>
@@ -3228,7 +3229,7 @@
           <a:p>
             <a:fld id="{1FBC307E-BFDF-4D62-B554-0C8B7619B15D}" type="datetimeFigureOut">
               <a:rPr lang="en-US" smtClean="0"/>
-              <a:t>2/22/2015</a:t>
+              <a:t>2/23/2015</a:t>
             </a:fld>
             <a:endParaRPr lang="en-US"/>
           </a:p>
@@ -3555,7 +3556,7 @@
           <a:p>
             <a:fld id="{1FBC307E-BFDF-4D62-B554-0C8B7619B15D}" type="datetimeFigureOut">
               <a:rPr lang="en-US" smtClean="0"/>
-              <a:t>2/22/2015</a:t>
+              <a:t>2/23/2015</a:t>
             </a:fld>
             <a:endParaRPr lang="en-US"/>
           </a:p>
@@ -3876,7 +3877,7 @@
           <a:p>
             <a:fld id="{1FBC307E-BFDF-4D62-B554-0C8B7619B15D}" type="datetimeFigureOut">
               <a:rPr lang="en-US" smtClean="0"/>
-              <a:t>2/22/2015</a:t>
+              <a:t>2/23/2015</a:t>
             </a:fld>
             <a:endParaRPr lang="en-US"/>
           </a:p>
@@ -4331,7 +4332,7 @@
           <a:p>
             <a:fld id="{1FBC307E-BFDF-4D62-B554-0C8B7619B15D}" type="datetimeFigureOut">
               <a:rPr lang="en-US" smtClean="0"/>
-              <a:t>2/22/2015</a:t>
+              <a:t>2/23/2015</a:t>
             </a:fld>
             <a:endParaRPr lang="en-US"/>
           </a:p>
@@ -4539,7 +4540,7 @@
           <a:p>
             <a:fld id="{1FBC307E-BFDF-4D62-B554-0C8B7619B15D}" type="datetimeFigureOut">
               <a:rPr lang="en-US" smtClean="0"/>
-              <a:t>2/22/2015</a:t>
+              <a:t>2/23/2015</a:t>
             </a:fld>
             <a:endParaRPr lang="en-US"/>
           </a:p>
@@ -4714,7 +4715,7 @@
           <a:p>
             <a:fld id="{1FBC307E-BFDF-4D62-B554-0C8B7619B15D}" type="datetimeFigureOut">
               <a:rPr lang="en-US" smtClean="0"/>
-              <a:t>2/22/2015</a:t>
+              <a:t>2/23/2015</a:t>
             </a:fld>
             <a:endParaRPr lang="en-US"/>
           </a:p>
@@ -5045,7 +5046,7 @@
           <a:p>
             <a:fld id="{1FBC307E-BFDF-4D62-B554-0C8B7619B15D}" type="datetimeFigureOut">
               <a:rPr lang="en-US" smtClean="0"/>
-              <a:t>2/22/2015</a:t>
+              <a:t>2/23/2015</a:t>
             </a:fld>
             <a:endParaRPr lang="en-US"/>
           </a:p>
@@ -5388,7 +5389,7 @@
           <a:p>
             <a:fld id="{1FBC307E-BFDF-4D62-B554-0C8B7619B15D}" type="datetimeFigureOut">
               <a:rPr lang="en-US" smtClean="0"/>
-              <a:t>2/22/2015</a:t>
+              <a:t>2/23/2015</a:t>
             </a:fld>
             <a:endParaRPr lang="en-US"/>
           </a:p>
@@ -7503,7 +7504,7 @@
           <a:p>
             <a:fld id="{1FBC307E-BFDF-4D62-B554-0C8B7619B15D}" type="datetimeFigureOut">
               <a:rPr lang="en-US" smtClean="0"/>
-              <a:t>2/22/2015</a:t>
+              <a:t>2/23/2015</a:t>
             </a:fld>
             <a:endParaRPr lang="en-US"/>
           </a:p>
@@ -8109,6 +8110,13 @@
   <p:clrMapOvr>
     <a:masterClrMapping/>
   </p:clrMapOvr>
+  <p:timing>
+    <p:tnLst>
+      <p:par>
+        <p:cTn id="1" dur="indefinite" restart="never" nodeType="tmRoot"/>
+      </p:par>
+    </p:tnLst>
+  </p:timing>
 </p:sld>
 </file>
 
@@ -8203,6 +8211,13 @@
   <p:clrMapOvr>
     <a:masterClrMapping/>
   </p:clrMapOvr>
+  <p:timing>
+    <p:tnLst>
+      <p:par>
+        <p:cTn id="1" dur="indefinite" restart="never" nodeType="tmRoot"/>
+      </p:par>
+    </p:tnLst>
+  </p:timing>
 </p:sld>
 </file>
 
@@ -8289,6 +8304,13 @@
   <p:clrMapOvr>
     <a:masterClrMapping/>
   </p:clrMapOvr>
+  <p:timing>
+    <p:tnLst>
+      <p:par>
+        <p:cTn id="1" dur="indefinite" restart="never" nodeType="tmRoot"/>
+      </p:par>
+    </p:tnLst>
+  </p:timing>
 </p:sld>
 </file>
 
@@ -8325,44 +8347,12 @@
           <a:lstStyle/>
           <a:p>
             <a:r>
+              <a:rPr lang="en-US" dirty="0" err="1" smtClean="0"/>
+              <a:t>AngularJS</a:t>
+            </a:r>
+            <a:r>
               <a:rPr lang="en-US" dirty="0" smtClean="0"/>
-              <a:t>Further Learning</a:t>
-            </a:r>
-            <a:endParaRPr lang="en-US" dirty="0"/>
-          </a:p>
-        </p:txBody>
-      </p:sp>
-      <p:sp>
-        <p:nvSpPr>
-          <p:cNvPr id="3" name="Content Placeholder 2"/>
-          <p:cNvSpPr>
-            <a:spLocks noGrp="1"/>
-          </p:cNvSpPr>
-          <p:nvPr>
-            <p:ph idx="1"/>
-          </p:nvPr>
-        </p:nvSpPr>
-        <p:spPr/>
-        <p:txBody>
-          <a:bodyPr/>
-          <a:lstStyle/>
-          <a:p>
-            <a:r>
-              <a:rPr lang="en-US" dirty="0" err="1" smtClean="0"/>
-              <a:t>Pluralsight</a:t>
-            </a:r>
-            <a:endParaRPr lang="en-US" dirty="0" smtClean="0"/>
-          </a:p>
-          <a:p>
-            <a:r>
-              <a:rPr lang="en-US" dirty="0" smtClean="0"/>
-              <a:t>Code School</a:t>
-            </a:r>
-          </a:p>
-          <a:p>
-            <a:r>
-              <a:rPr lang="en-US" dirty="0" smtClean="0"/>
-              <a:t>Adventures in Angular</a:t>
+              <a:t> 2.0</a:t>
             </a:r>
             <a:endParaRPr lang="en-US" dirty="0"/>
           </a:p>
@@ -8371,13 +8361,20 @@
     </p:spTree>
     <p:extLst>
       <p:ext uri="{BB962C8B-B14F-4D97-AF65-F5344CB8AC3E}">
-        <p14:creationId xmlns:p14="http://schemas.microsoft.com/office/powerpoint/2010/main" val="885975201"/>
+        <p14:creationId xmlns:p14="http://schemas.microsoft.com/office/powerpoint/2010/main" val="2643025898"/>
       </p:ext>
     </p:extLst>
   </p:cSld>
   <p:clrMapOvr>
     <a:masterClrMapping/>
   </p:clrMapOvr>
+  <p:timing>
+    <p:tnLst>
+      <p:par>
+        <p:cTn id="1" dur="indefinite" restart="never" nodeType="tmRoot"/>
+      </p:par>
+    </p:tnLst>
+  </p:timing>
 </p:sld>
 </file>
 
@@ -8400,6 +8397,102 @@
       </p:grpSpPr>
       <p:sp>
         <p:nvSpPr>
+          <p:cNvPr id="2" name="Title 1"/>
+          <p:cNvSpPr>
+            <a:spLocks noGrp="1"/>
+          </p:cNvSpPr>
+          <p:nvPr>
+            <p:ph type="title"/>
+          </p:nvPr>
+        </p:nvSpPr>
+        <p:spPr/>
+        <p:txBody>
+          <a:bodyPr/>
+          <a:lstStyle/>
+          <a:p>
+            <a:r>
+              <a:rPr lang="en-US" dirty="0" smtClean="0"/>
+              <a:t>Further Learning</a:t>
+            </a:r>
+            <a:endParaRPr lang="en-US" dirty="0"/>
+          </a:p>
+        </p:txBody>
+      </p:sp>
+      <p:sp>
+        <p:nvSpPr>
+          <p:cNvPr id="3" name="Content Placeholder 2"/>
+          <p:cNvSpPr>
+            <a:spLocks noGrp="1"/>
+          </p:cNvSpPr>
+          <p:nvPr>
+            <p:ph idx="1"/>
+          </p:nvPr>
+        </p:nvSpPr>
+        <p:spPr/>
+        <p:txBody>
+          <a:bodyPr/>
+          <a:lstStyle/>
+          <a:p>
+            <a:r>
+              <a:rPr lang="en-US" dirty="0" err="1" smtClean="0"/>
+              <a:t>Pluralsight</a:t>
+            </a:r>
+            <a:endParaRPr lang="en-US" dirty="0" smtClean="0"/>
+          </a:p>
+          <a:p>
+            <a:r>
+              <a:rPr lang="en-US" dirty="0" smtClean="0"/>
+              <a:t>Code School</a:t>
+            </a:r>
+          </a:p>
+          <a:p>
+            <a:r>
+              <a:rPr lang="en-US" dirty="0" smtClean="0"/>
+              <a:t>Adventures in Angular</a:t>
+            </a:r>
+            <a:endParaRPr lang="en-US" dirty="0"/>
+          </a:p>
+        </p:txBody>
+      </p:sp>
+    </p:spTree>
+    <p:extLst>
+      <p:ext uri="{BB962C8B-B14F-4D97-AF65-F5344CB8AC3E}">
+        <p14:creationId xmlns:p14="http://schemas.microsoft.com/office/powerpoint/2010/main" val="885975201"/>
+      </p:ext>
+    </p:extLst>
+  </p:cSld>
+  <p:clrMapOvr>
+    <a:masterClrMapping/>
+  </p:clrMapOvr>
+  <p:timing>
+    <p:tnLst>
+      <p:par>
+        <p:cTn id="1" dur="indefinite" restart="never" nodeType="tmRoot"/>
+      </p:par>
+    </p:tnLst>
+  </p:timing>
+</p:sld>
+</file>
+
+<file path=ppt/slides/slide14.xml><?xml version="1.0" encoding="utf-8"?>
+<p:sld xmlns:a="http://schemas.openxmlformats.org/drawingml/2006/main" xmlns:r="http://schemas.openxmlformats.org/officeDocument/2006/relationships" xmlns:p="http://schemas.openxmlformats.org/presentationml/2006/main">
+  <p:cSld>
+    <p:spTree>
+      <p:nvGrpSpPr>
+        <p:cNvPr id="1" name=""/>
+        <p:cNvGrpSpPr/>
+        <p:nvPr/>
+      </p:nvGrpSpPr>
+      <p:grpSpPr>
+        <a:xfrm>
+          <a:off x="0" y="0"/>
+          <a:ext cx="0" cy="0"/>
+          <a:chOff x="0" y="0"/>
+          <a:chExt cx="0" cy="0"/>
+        </a:xfrm>
+      </p:grpSpPr>
+      <p:sp>
+        <p:nvSpPr>
           <p:cNvPr id="3" name="Content Placeholder 2"/>
           <p:cNvSpPr>
             <a:spLocks noGrp="1"/>
@@ -8579,7 +8672,11 @@
           <a:bodyPr/>
           <a:lstStyle/>
           <a:p>
-            <a:endParaRPr lang="en-US"/>
+            <a:r>
+              <a:rPr lang="en-US" dirty="0" smtClean="0"/>
+              <a:t>`</a:t>
+            </a:r>
+            <a:endParaRPr lang="en-US" dirty="0"/>
           </a:p>
         </p:txBody>
       </p:sp>
@@ -9550,6 +9647,13 @@
   <p:clrMapOvr>
     <a:masterClrMapping/>
   </p:clrMapOvr>
+  <p:timing>
+    <p:tnLst>
+      <p:par>
+        <p:cTn id="1" dur="indefinite" restart="never" nodeType="tmRoot"/>
+      </p:par>
+    </p:tnLst>
+  </p:timing>
 </p:sld>
 </file>
 
@@ -9826,6 +9930,13 @@
   <p:clrMapOvr>
     <a:masterClrMapping/>
   </p:clrMapOvr>
+  <p:timing>
+    <p:tnLst>
+      <p:par>
+        <p:cTn id="1" dur="indefinite" restart="never" nodeType="tmRoot"/>
+      </p:par>
+    </p:tnLst>
+  </p:timing>
 </p:sld>
 </file>
 

</xml_diff>